<commit_message>
Added some ease in+out slides and updated project #2 of patterns and frameworks
</commit_message>
<xml_diff>
--- a/6044_FramPat/D2D/W01/INFO_6044_Engine_F23_W01D01_Course_Intro.pptx
+++ b/6044_FramPat/D2D/W01/INFO_6044_Engine_F23_W01D01_Course_Intro.pptx
@@ -225,7 +225,7 @@
             <a:fld id="{3D3F9196-5FBD-45F8-86BD-A3D90AC79AC7}" type="datetimeFigureOut">
               <a:rPr lang="en-CA" smtClean="0"/>
               <a:pPr/>
-              <a:t>2023-09-07</a:t>
+              <a:t>2023-11-27</a:t>
             </a:fld>
             <a:endParaRPr lang="en-CA"/>
           </a:p>
@@ -526,7 +526,7 @@
             <a:fld id="{8F6BCBE8-30B0-4476-8762-9236B142003A}" type="datetimeFigureOut">
               <a:rPr lang="en-US" smtClean="0"/>
               <a:pPr/>
-              <a:t>9/7/2023</a:t>
+              <a:t>11/27/2023</a:t>
             </a:fld>
             <a:endParaRPr lang="en-US" sz="1100" dirty="0">
               <a:solidFill>
@@ -1223,7 +1223,7 @@
             <a:fld id="{8F6BCBE8-30B0-4476-8762-9236B142003A}" type="datetimeFigureOut">
               <a:rPr lang="en-US" smtClean="0"/>
               <a:pPr/>
-              <a:t>9/7/2023</a:t>
+              <a:t>11/27/2023</a:t>
             </a:fld>
             <a:endParaRPr lang="en-US" sz="1100" dirty="0">
               <a:solidFill>
@@ -1408,7 +1408,7 @@
             <a:fld id="{8F6BCBE8-30B0-4476-8762-9236B142003A}" type="datetimeFigureOut">
               <a:rPr lang="en-US" smtClean="0"/>
               <a:pPr/>
-              <a:t>9/7/2023</a:t>
+              <a:t>11/27/2023</a:t>
             </a:fld>
             <a:endParaRPr lang="en-US" sz="1100" dirty="0">
               <a:solidFill>
@@ -1583,7 +1583,7 @@
             <a:fld id="{8F6BCBE8-30B0-4476-8762-9236B142003A}" type="datetimeFigureOut">
               <a:rPr lang="en-US" smtClean="0"/>
               <a:pPr/>
-              <a:t>9/7/2023</a:t>
+              <a:t>11/27/2023</a:t>
             </a:fld>
             <a:endParaRPr lang="en-US" sz="1100" dirty="0">
               <a:solidFill>
@@ -3041,7 +3041,7 @@
             <a:fld id="{8F6BCBE8-30B0-4476-8762-9236B142003A}" type="datetimeFigureOut">
               <a:rPr lang="en-US" smtClean="0"/>
               <a:pPr/>
-              <a:t>9/7/2023</a:t>
+              <a:t>11/27/2023</a:t>
             </a:fld>
             <a:endParaRPr lang="en-US" sz="1100" dirty="0">
               <a:solidFill>
@@ -3630,7 +3630,7 @@
             <a:fld id="{8F6BCBE8-30B0-4476-8762-9236B142003A}" type="datetimeFigureOut">
               <a:rPr lang="en-US" smtClean="0"/>
               <a:pPr/>
-              <a:t>9/7/2023</a:t>
+              <a:t>11/27/2023</a:t>
             </a:fld>
             <a:endParaRPr lang="en-US" sz="1100" dirty="0">
               <a:solidFill>
@@ -4069,7 +4069,7 @@
             <a:fld id="{8F6BCBE8-30B0-4476-8762-9236B142003A}" type="datetimeFigureOut">
               <a:rPr lang="en-US" smtClean="0"/>
               <a:pPr/>
-              <a:t>9/7/2023</a:t>
+              <a:t>11/27/2023</a:t>
             </a:fld>
             <a:endParaRPr lang="en-US" sz="1100" dirty="0">
               <a:solidFill>
@@ -4616,7 +4616,7 @@
             <a:fld id="{8F6BCBE8-30B0-4476-8762-9236B142003A}" type="datetimeFigureOut">
               <a:rPr lang="en-US" smtClean="0"/>
               <a:pPr/>
-              <a:t>9/7/2023</a:t>
+              <a:t>11/27/2023</a:t>
             </a:fld>
             <a:endParaRPr lang="en-US" sz="1100" dirty="0">
               <a:solidFill>
@@ -4717,7 +4717,7 @@
             <a:fld id="{8F6BCBE8-30B0-4476-8762-9236B142003A}" type="datetimeFigureOut">
               <a:rPr lang="en-US" smtClean="0"/>
               <a:pPr/>
-              <a:t>9/7/2023</a:t>
+              <a:t>11/27/2023</a:t>
             </a:fld>
             <a:endParaRPr lang="en-US" sz="1100" dirty="0">
               <a:solidFill>
@@ -4975,7 +4975,7 @@
             <a:fld id="{8F6BCBE8-30B0-4476-8762-9236B142003A}" type="datetimeFigureOut">
               <a:rPr lang="en-US" smtClean="0"/>
               <a:pPr/>
-              <a:t>9/7/2023</a:t>
+              <a:t>11/27/2023</a:t>
             </a:fld>
             <a:endParaRPr lang="en-US" sz="1100" dirty="0">
               <a:solidFill>
@@ -5697,7 +5697,7 @@
             <a:fld id="{8F6BCBE8-30B0-4476-8762-9236B142003A}" type="datetimeFigureOut">
               <a:rPr lang="en-US" smtClean="0"/>
               <a:pPr/>
-              <a:t>9/7/2023</a:t>
+              <a:t>11/27/2023</a:t>
             </a:fld>
             <a:endParaRPr lang="en-US" sz="1100" dirty="0">
               <a:solidFill>
@@ -6353,7 +6353,7 @@
             <a:fld id="{8F6BCBE8-30B0-4476-8762-9236B142003A}" type="datetimeFigureOut">
               <a:rPr lang="en-US" smtClean="0"/>
               <a:pPr/>
-              <a:t>9/7/2023</a:t>
+              <a:t>11/27/2023</a:t>
             </a:fld>
             <a:endParaRPr lang="en-US" sz="1100" dirty="0">
               <a:solidFill>
@@ -14527,7 +14527,12 @@
             <p:ph type="title"/>
           </p:nvPr>
         </p:nvSpPr>
-        <p:spPr/>
+        <p:spPr>
+          <a:xfrm>
+            <a:off x="685800" y="57150"/>
+            <a:ext cx="7772400" cy="685800"/>
+          </a:xfrm>
+        </p:spPr>
         <p:txBody>
           <a:bodyPr/>
           <a:lstStyle/>

</xml_diff>